<commit_message>
adds containers and images material
</commit_message>
<xml_diff>
--- a/Misc Topics/Executables and Paths.pptx
+++ b/Misc Topics/Executables and Paths.pptx
@@ -13,8 +13,8 @@
     <p:sldId id="258" r:id="rId4"/>
     <p:sldId id="259" r:id="rId5"/>
     <p:sldId id="260" r:id="rId6"/>
-    <p:sldId id="261" r:id="rId7"/>
-    <p:sldId id="262" r:id="rId8"/>
+    <p:sldId id="262" r:id="rId7"/>
+    <p:sldId id="261" r:id="rId8"/>
     <p:sldId id="264" r:id="rId9"/>
     <p:sldId id="270" r:id="rId10"/>
     <p:sldId id="268" r:id="rId11"/>
@@ -211,7 +211,7 @@
           <a:p>
             <a:fld id="{7D2F5B96-EC90-4B10-91AC-E32DA21E81E1}" type="datetimeFigureOut">
               <a:rPr lang="en-US" smtClean="0"/>
-              <a:t>9/17/2025</a:t>
+              <a:t>9/19/2025</a:t>
             </a:fld>
             <a:endParaRPr lang="en-US"/>
           </a:p>
@@ -1031,7 +1031,7 @@
           <a:p>
             <a:fld id="{AD3160A9-B1E4-4AE8-B854-46ED2C2068C2}" type="datetimeFigureOut">
               <a:rPr lang="en-US" smtClean="0"/>
-              <a:t>9/17/2025</a:t>
+              <a:t>9/19/2025</a:t>
             </a:fld>
             <a:endParaRPr lang="en-US"/>
           </a:p>
@@ -1229,7 +1229,7 @@
           <a:p>
             <a:fld id="{AD3160A9-B1E4-4AE8-B854-46ED2C2068C2}" type="datetimeFigureOut">
               <a:rPr lang="en-US" smtClean="0"/>
-              <a:t>9/17/2025</a:t>
+              <a:t>9/19/2025</a:t>
             </a:fld>
             <a:endParaRPr lang="en-US"/>
           </a:p>
@@ -1437,7 +1437,7 @@
           <a:p>
             <a:fld id="{AD3160A9-B1E4-4AE8-B854-46ED2C2068C2}" type="datetimeFigureOut">
               <a:rPr lang="en-US" smtClean="0"/>
-              <a:t>9/17/2025</a:t>
+              <a:t>9/19/2025</a:t>
             </a:fld>
             <a:endParaRPr lang="en-US"/>
           </a:p>
@@ -1635,7 +1635,7 @@
           <a:p>
             <a:fld id="{AD3160A9-B1E4-4AE8-B854-46ED2C2068C2}" type="datetimeFigureOut">
               <a:rPr lang="en-US" smtClean="0"/>
-              <a:t>9/17/2025</a:t>
+              <a:t>9/19/2025</a:t>
             </a:fld>
             <a:endParaRPr lang="en-US"/>
           </a:p>
@@ -1910,7 +1910,7 @@
           <a:p>
             <a:fld id="{AD3160A9-B1E4-4AE8-B854-46ED2C2068C2}" type="datetimeFigureOut">
               <a:rPr lang="en-US" smtClean="0"/>
-              <a:t>9/17/2025</a:t>
+              <a:t>9/19/2025</a:t>
             </a:fld>
             <a:endParaRPr lang="en-US"/>
           </a:p>
@@ -2175,7 +2175,7 @@
           <a:p>
             <a:fld id="{AD3160A9-B1E4-4AE8-B854-46ED2C2068C2}" type="datetimeFigureOut">
               <a:rPr lang="en-US" smtClean="0"/>
-              <a:t>9/17/2025</a:t>
+              <a:t>9/19/2025</a:t>
             </a:fld>
             <a:endParaRPr lang="en-US"/>
           </a:p>
@@ -2587,7 +2587,7 @@
           <a:p>
             <a:fld id="{AD3160A9-B1E4-4AE8-B854-46ED2C2068C2}" type="datetimeFigureOut">
               <a:rPr lang="en-US" smtClean="0"/>
-              <a:t>9/17/2025</a:t>
+              <a:t>9/19/2025</a:t>
             </a:fld>
             <a:endParaRPr lang="en-US"/>
           </a:p>
@@ -2728,7 +2728,7 @@
           <a:p>
             <a:fld id="{AD3160A9-B1E4-4AE8-B854-46ED2C2068C2}" type="datetimeFigureOut">
               <a:rPr lang="en-US" smtClean="0"/>
-              <a:t>9/17/2025</a:t>
+              <a:t>9/19/2025</a:t>
             </a:fld>
             <a:endParaRPr lang="en-US"/>
           </a:p>
@@ -2841,7 +2841,7 @@
           <a:p>
             <a:fld id="{AD3160A9-B1E4-4AE8-B854-46ED2C2068C2}" type="datetimeFigureOut">
               <a:rPr lang="en-US" smtClean="0"/>
-              <a:t>9/17/2025</a:t>
+              <a:t>9/19/2025</a:t>
             </a:fld>
             <a:endParaRPr lang="en-US"/>
           </a:p>
@@ -3152,7 +3152,7 @@
           <a:p>
             <a:fld id="{AD3160A9-B1E4-4AE8-B854-46ED2C2068C2}" type="datetimeFigureOut">
               <a:rPr lang="en-US" smtClean="0"/>
-              <a:t>9/17/2025</a:t>
+              <a:t>9/19/2025</a:t>
             </a:fld>
             <a:endParaRPr lang="en-US"/>
           </a:p>
@@ -3440,7 +3440,7 @@
           <a:p>
             <a:fld id="{AD3160A9-B1E4-4AE8-B854-46ED2C2068C2}" type="datetimeFigureOut">
               <a:rPr lang="en-US" smtClean="0"/>
-              <a:t>9/17/2025</a:t>
+              <a:t>9/19/2025</a:t>
             </a:fld>
             <a:endParaRPr lang="en-US"/>
           </a:p>
@@ -3681,7 +3681,7 @@
           <a:p>
             <a:fld id="{AD3160A9-B1E4-4AE8-B854-46ED2C2068C2}" type="datetimeFigureOut">
               <a:rPr lang="en-US" smtClean="0"/>
-              <a:t>9/17/2025</a:t>
+              <a:t>9/19/2025</a:t>
             </a:fld>
             <a:endParaRPr lang="en-US"/>
           </a:p>
@@ -5526,6 +5526,208 @@
   <p:clrMapOvr>
     <a:masterClrMapping/>
   </p:clrMapOvr>
+  <p:timing>
+    <p:tnLst>
+      <p:par>
+        <p:cTn id="1" dur="indefinite" restart="never" nodeType="tmRoot">
+          <p:childTnLst>
+            <p:seq concurrent="1" nextAc="seek">
+              <p:cTn id="2" dur="indefinite" nodeType="mainSeq">
+                <p:childTnLst>
+                  <p:par>
+                    <p:cTn id="3" fill="hold">
+                      <p:stCondLst>
+                        <p:cond delay="indefinite"/>
+                      </p:stCondLst>
+                      <p:childTnLst>
+                        <p:par>
+                          <p:cTn id="4" fill="hold">
+                            <p:stCondLst>
+                              <p:cond delay="0"/>
+                            </p:stCondLst>
+                            <p:childTnLst>
+                              <p:par>
+                                <p:cTn id="5" presetID="1" presetClass="entr" presetSubtype="0" fill="hold" grpId="0" nodeType="clickEffect">
+                                  <p:stCondLst>
+                                    <p:cond delay="0"/>
+                                  </p:stCondLst>
+                                  <p:childTnLst>
+                                    <p:set>
+                                      <p:cBhvr>
+                                        <p:cTn id="6" dur="1" fill="hold">
+                                          <p:stCondLst>
+                                            <p:cond delay="0"/>
+                                          </p:stCondLst>
+                                        </p:cTn>
+                                        <p:tgtEl>
+                                          <p:spTgt spid="3">
+                                            <p:txEl>
+                                              <p:pRg st="0" end="0"/>
+                                            </p:txEl>
+                                          </p:spTgt>
+                                        </p:tgtEl>
+                                        <p:attrNameLst>
+                                          <p:attrName>style.visibility</p:attrName>
+                                        </p:attrNameLst>
+                                      </p:cBhvr>
+                                      <p:to>
+                                        <p:strVal val="visible"/>
+                                      </p:to>
+                                    </p:set>
+                                  </p:childTnLst>
+                                </p:cTn>
+                              </p:par>
+                              <p:par>
+                                <p:cTn id="7" presetID="1" presetClass="entr" presetSubtype="0" fill="hold" grpId="0" nodeType="withEffect">
+                                  <p:stCondLst>
+                                    <p:cond delay="0"/>
+                                  </p:stCondLst>
+                                  <p:childTnLst>
+                                    <p:set>
+                                      <p:cBhvr>
+                                        <p:cTn id="8" dur="1" fill="hold">
+                                          <p:stCondLst>
+                                            <p:cond delay="0"/>
+                                          </p:stCondLst>
+                                        </p:cTn>
+                                        <p:tgtEl>
+                                          <p:spTgt spid="3">
+                                            <p:txEl>
+                                              <p:pRg st="1" end="1"/>
+                                            </p:txEl>
+                                          </p:spTgt>
+                                        </p:tgtEl>
+                                        <p:attrNameLst>
+                                          <p:attrName>style.visibility</p:attrName>
+                                        </p:attrNameLst>
+                                      </p:cBhvr>
+                                      <p:to>
+                                        <p:strVal val="visible"/>
+                                      </p:to>
+                                    </p:set>
+                                  </p:childTnLst>
+                                </p:cTn>
+                              </p:par>
+                              <p:par>
+                                <p:cTn id="9" presetID="1" presetClass="entr" presetSubtype="0" fill="hold" grpId="0" nodeType="withEffect">
+                                  <p:stCondLst>
+                                    <p:cond delay="0"/>
+                                  </p:stCondLst>
+                                  <p:childTnLst>
+                                    <p:set>
+                                      <p:cBhvr>
+                                        <p:cTn id="10" dur="1" fill="hold">
+                                          <p:stCondLst>
+                                            <p:cond delay="0"/>
+                                          </p:stCondLst>
+                                        </p:cTn>
+                                        <p:tgtEl>
+                                          <p:spTgt spid="3">
+                                            <p:txEl>
+                                              <p:pRg st="2" end="2"/>
+                                            </p:txEl>
+                                          </p:spTgt>
+                                        </p:tgtEl>
+                                        <p:attrNameLst>
+                                          <p:attrName>style.visibility</p:attrName>
+                                        </p:attrNameLst>
+                                      </p:cBhvr>
+                                      <p:to>
+                                        <p:strVal val="visible"/>
+                                      </p:to>
+                                    </p:set>
+                                  </p:childTnLst>
+                                </p:cTn>
+                              </p:par>
+                              <p:par>
+                                <p:cTn id="11" presetID="1" presetClass="entr" presetSubtype="0" fill="hold" grpId="0" nodeType="withEffect">
+                                  <p:stCondLst>
+                                    <p:cond delay="0"/>
+                                  </p:stCondLst>
+                                  <p:childTnLst>
+                                    <p:set>
+                                      <p:cBhvr>
+                                        <p:cTn id="12" dur="1" fill="hold">
+                                          <p:stCondLst>
+                                            <p:cond delay="0"/>
+                                          </p:stCondLst>
+                                        </p:cTn>
+                                        <p:tgtEl>
+                                          <p:spTgt spid="3">
+                                            <p:txEl>
+                                              <p:pRg st="3" end="3"/>
+                                            </p:txEl>
+                                          </p:spTgt>
+                                        </p:tgtEl>
+                                        <p:attrNameLst>
+                                          <p:attrName>style.visibility</p:attrName>
+                                        </p:attrNameLst>
+                                      </p:cBhvr>
+                                      <p:to>
+                                        <p:strVal val="visible"/>
+                                      </p:to>
+                                    </p:set>
+                                  </p:childTnLst>
+                                </p:cTn>
+                              </p:par>
+                              <p:par>
+                                <p:cTn id="13" presetID="1" presetClass="entr" presetSubtype="0" fill="hold" nodeType="withEffect">
+                                  <p:stCondLst>
+                                    <p:cond delay="0"/>
+                                  </p:stCondLst>
+                                  <p:childTnLst>
+                                    <p:set>
+                                      <p:cBhvr>
+                                        <p:cTn id="14" dur="1" fill="hold">
+                                          <p:stCondLst>
+                                            <p:cond delay="0"/>
+                                          </p:stCondLst>
+                                        </p:cTn>
+                                        <p:tgtEl>
+                                          <p:spTgt spid="5"/>
+                                        </p:tgtEl>
+                                        <p:attrNameLst>
+                                          <p:attrName>style.visibility</p:attrName>
+                                        </p:attrNameLst>
+                                      </p:cBhvr>
+                                      <p:to>
+                                        <p:strVal val="visible"/>
+                                      </p:to>
+                                    </p:set>
+                                  </p:childTnLst>
+                                </p:cTn>
+                              </p:par>
+                            </p:childTnLst>
+                          </p:cTn>
+                        </p:par>
+                      </p:childTnLst>
+                    </p:cTn>
+                  </p:par>
+                </p:childTnLst>
+              </p:cTn>
+              <p:prevCondLst>
+                <p:cond evt="onPrev" delay="0">
+                  <p:tgtEl>
+                    <p:sldTgt/>
+                  </p:tgtEl>
+                </p:cond>
+              </p:prevCondLst>
+              <p:nextCondLst>
+                <p:cond evt="onNext" delay="0">
+                  <p:tgtEl>
+                    <p:sldTgt/>
+                  </p:tgtEl>
+                </p:cond>
+              </p:nextCondLst>
+            </p:seq>
+          </p:childTnLst>
+        </p:cTn>
+      </p:par>
+    </p:tnLst>
+    <p:bldLst>
+      <p:bldP spid="3" grpId="0" uiExpand="1" build="allAtOnce"/>
+    </p:bldLst>
+  </p:timing>
 </p:sld>
 </file>
 
@@ -5633,6 +5835,235 @@
   <p:clrMapOvr>
     <a:masterClrMapping/>
   </p:clrMapOvr>
+  <p:timing>
+    <p:tnLst>
+      <p:par>
+        <p:cTn id="1" dur="indefinite" restart="never" nodeType="tmRoot">
+          <p:childTnLst>
+            <p:seq concurrent="1" nextAc="seek">
+              <p:cTn id="2" dur="indefinite" nodeType="mainSeq">
+                <p:childTnLst>
+                  <p:par>
+                    <p:cTn id="3" fill="hold">
+                      <p:stCondLst>
+                        <p:cond delay="indefinite"/>
+                      </p:stCondLst>
+                      <p:childTnLst>
+                        <p:par>
+                          <p:cTn id="4" fill="hold">
+                            <p:stCondLst>
+                              <p:cond delay="0"/>
+                            </p:stCondLst>
+                            <p:childTnLst>
+                              <p:par>
+                                <p:cTn id="5" presetID="1" presetClass="entr" presetSubtype="0" fill="hold" grpId="0" nodeType="clickEffect">
+                                  <p:stCondLst>
+                                    <p:cond delay="0"/>
+                                  </p:stCondLst>
+                                  <p:childTnLst>
+                                    <p:set>
+                                      <p:cBhvr>
+                                        <p:cTn id="6" dur="1" fill="hold">
+                                          <p:stCondLst>
+                                            <p:cond delay="0"/>
+                                          </p:stCondLst>
+                                        </p:cTn>
+                                        <p:tgtEl>
+                                          <p:spTgt spid="3">
+                                            <p:txEl>
+                                              <p:pRg st="0" end="0"/>
+                                            </p:txEl>
+                                          </p:spTgt>
+                                        </p:tgtEl>
+                                        <p:attrNameLst>
+                                          <p:attrName>style.visibility</p:attrName>
+                                        </p:attrNameLst>
+                                      </p:cBhvr>
+                                      <p:to>
+                                        <p:strVal val="visible"/>
+                                      </p:to>
+                                    </p:set>
+                                  </p:childTnLst>
+                                </p:cTn>
+                              </p:par>
+                            </p:childTnLst>
+                          </p:cTn>
+                        </p:par>
+                      </p:childTnLst>
+                    </p:cTn>
+                  </p:par>
+                  <p:par>
+                    <p:cTn id="7" fill="hold">
+                      <p:stCondLst>
+                        <p:cond delay="indefinite"/>
+                      </p:stCondLst>
+                      <p:childTnLst>
+                        <p:par>
+                          <p:cTn id="8" fill="hold">
+                            <p:stCondLst>
+                              <p:cond delay="0"/>
+                            </p:stCondLst>
+                            <p:childTnLst>
+                              <p:par>
+                                <p:cTn id="9" presetID="1" presetClass="entr" presetSubtype="0" fill="hold" grpId="0" nodeType="clickEffect">
+                                  <p:stCondLst>
+                                    <p:cond delay="0"/>
+                                  </p:stCondLst>
+                                  <p:childTnLst>
+                                    <p:set>
+                                      <p:cBhvr>
+                                        <p:cTn id="10" dur="1" fill="hold">
+                                          <p:stCondLst>
+                                            <p:cond delay="0"/>
+                                          </p:stCondLst>
+                                        </p:cTn>
+                                        <p:tgtEl>
+                                          <p:spTgt spid="3">
+                                            <p:txEl>
+                                              <p:pRg st="1" end="1"/>
+                                            </p:txEl>
+                                          </p:spTgt>
+                                        </p:tgtEl>
+                                        <p:attrNameLst>
+                                          <p:attrName>style.visibility</p:attrName>
+                                        </p:attrNameLst>
+                                      </p:cBhvr>
+                                      <p:to>
+                                        <p:strVal val="visible"/>
+                                      </p:to>
+                                    </p:set>
+                                  </p:childTnLst>
+                                </p:cTn>
+                              </p:par>
+                            </p:childTnLst>
+                          </p:cTn>
+                        </p:par>
+                      </p:childTnLst>
+                    </p:cTn>
+                  </p:par>
+                  <p:par>
+                    <p:cTn id="11" fill="hold">
+                      <p:stCondLst>
+                        <p:cond delay="indefinite"/>
+                      </p:stCondLst>
+                      <p:childTnLst>
+                        <p:par>
+                          <p:cTn id="12" fill="hold">
+                            <p:stCondLst>
+                              <p:cond delay="0"/>
+                            </p:stCondLst>
+                            <p:childTnLst>
+                              <p:par>
+                                <p:cTn id="13" presetID="1" presetClass="entr" presetSubtype="0" fill="hold" grpId="0" nodeType="clickEffect">
+                                  <p:stCondLst>
+                                    <p:cond delay="0"/>
+                                  </p:stCondLst>
+                                  <p:childTnLst>
+                                    <p:set>
+                                      <p:cBhvr>
+                                        <p:cTn id="14" dur="1" fill="hold">
+                                          <p:stCondLst>
+                                            <p:cond delay="0"/>
+                                          </p:stCondLst>
+                                        </p:cTn>
+                                        <p:tgtEl>
+                                          <p:spTgt spid="3">
+                                            <p:txEl>
+                                              <p:pRg st="2" end="2"/>
+                                            </p:txEl>
+                                          </p:spTgt>
+                                        </p:tgtEl>
+                                        <p:attrNameLst>
+                                          <p:attrName>style.visibility</p:attrName>
+                                        </p:attrNameLst>
+                                      </p:cBhvr>
+                                      <p:to>
+                                        <p:strVal val="visible"/>
+                                      </p:to>
+                                    </p:set>
+                                  </p:childTnLst>
+                                </p:cTn>
+                              </p:par>
+                            </p:childTnLst>
+                          </p:cTn>
+                        </p:par>
+                      </p:childTnLst>
+                    </p:cTn>
+                  </p:par>
+                  <p:par>
+                    <p:cTn id="15" fill="hold">
+                      <p:stCondLst>
+                        <p:cond delay="indefinite"/>
+                      </p:stCondLst>
+                      <p:childTnLst>
+                        <p:par>
+                          <p:cTn id="16" fill="hold">
+                            <p:stCondLst>
+                              <p:cond delay="0"/>
+                            </p:stCondLst>
+                            <p:childTnLst>
+                              <p:par>
+                                <p:cTn id="17" presetID="1" presetClass="entr" presetSubtype="0" fill="hold" grpId="0" nodeType="clickEffect">
+                                  <p:stCondLst>
+                                    <p:cond delay="0"/>
+                                  </p:stCondLst>
+                                  <p:childTnLst>
+                                    <p:set>
+                                      <p:cBhvr>
+                                        <p:cTn id="18" dur="1" fill="hold">
+                                          <p:stCondLst>
+                                            <p:cond delay="0"/>
+                                          </p:stCondLst>
+                                        </p:cTn>
+                                        <p:tgtEl>
+                                          <p:spTgt spid="3">
+                                            <p:txEl>
+                                              <p:pRg st="4" end="4"/>
+                                            </p:txEl>
+                                          </p:spTgt>
+                                        </p:tgtEl>
+                                        <p:attrNameLst>
+                                          <p:attrName>style.visibility</p:attrName>
+                                        </p:attrNameLst>
+                                      </p:cBhvr>
+                                      <p:to>
+                                        <p:strVal val="visible"/>
+                                      </p:to>
+                                    </p:set>
+                                  </p:childTnLst>
+                                </p:cTn>
+                              </p:par>
+                            </p:childTnLst>
+                          </p:cTn>
+                        </p:par>
+                      </p:childTnLst>
+                    </p:cTn>
+                  </p:par>
+                </p:childTnLst>
+              </p:cTn>
+              <p:prevCondLst>
+                <p:cond evt="onPrev" delay="0">
+                  <p:tgtEl>
+                    <p:sldTgt/>
+                  </p:tgtEl>
+                </p:cond>
+              </p:prevCondLst>
+              <p:nextCondLst>
+                <p:cond evt="onNext" delay="0">
+                  <p:tgtEl>
+                    <p:sldTgt/>
+                  </p:tgtEl>
+                </p:cond>
+              </p:nextCondLst>
+            </p:seq>
+          </p:childTnLst>
+        </p:cTn>
+      </p:par>
+    </p:tnLst>
+    <p:bldLst>
+      <p:bldP spid="3" grpId="0" build="p"/>
+    </p:bldLst>
+  </p:timing>
 </p:sld>
 </file>
 
@@ -5892,6 +6323,81 @@
   <p:clrMapOvr>
     <a:masterClrMapping/>
   </p:clrMapOvr>
+  <p:timing>
+    <p:tnLst>
+      <p:par>
+        <p:cTn id="1" dur="indefinite" restart="never" nodeType="tmRoot">
+          <p:childTnLst>
+            <p:seq concurrent="1" nextAc="seek">
+              <p:cTn id="2" dur="indefinite" nodeType="mainSeq">
+                <p:childTnLst>
+                  <p:par>
+                    <p:cTn id="3" fill="hold">
+                      <p:stCondLst>
+                        <p:cond delay="indefinite"/>
+                      </p:stCondLst>
+                      <p:childTnLst>
+                        <p:par>
+                          <p:cTn id="4" fill="hold">
+                            <p:stCondLst>
+                              <p:cond delay="0"/>
+                            </p:stCondLst>
+                            <p:childTnLst>
+                              <p:par>
+                                <p:cTn id="5" presetID="1" presetClass="entr" presetSubtype="0" fill="hold" nodeType="clickEffect">
+                                  <p:stCondLst>
+                                    <p:cond delay="0"/>
+                                  </p:stCondLst>
+                                  <p:childTnLst>
+                                    <p:set>
+                                      <p:cBhvr>
+                                        <p:cTn id="6" dur="1" fill="hold">
+                                          <p:stCondLst>
+                                            <p:cond delay="0"/>
+                                          </p:stCondLst>
+                                        </p:cTn>
+                                        <p:tgtEl>
+                                          <p:spTgt spid="1026"/>
+                                        </p:tgtEl>
+                                        <p:attrNameLst>
+                                          <p:attrName>style.visibility</p:attrName>
+                                        </p:attrNameLst>
+                                      </p:cBhvr>
+                                      <p:to>
+                                        <p:strVal val="visible"/>
+                                      </p:to>
+                                    </p:set>
+                                  </p:childTnLst>
+                                </p:cTn>
+                              </p:par>
+                            </p:childTnLst>
+                          </p:cTn>
+                        </p:par>
+                      </p:childTnLst>
+                    </p:cTn>
+                  </p:par>
+                </p:childTnLst>
+              </p:cTn>
+              <p:prevCondLst>
+                <p:cond evt="onPrev" delay="0">
+                  <p:tgtEl>
+                    <p:sldTgt/>
+                  </p:tgtEl>
+                </p:cond>
+              </p:prevCondLst>
+              <p:nextCondLst>
+                <p:cond evt="onNext" delay="0">
+                  <p:tgtEl>
+                    <p:sldTgt/>
+                  </p:tgtEl>
+                </p:cond>
+              </p:nextCondLst>
+            </p:seq>
+          </p:childTnLst>
+        </p:cTn>
+      </p:par>
+    </p:tnLst>
+  </p:timing>
 </p:sld>
 </file>
 
@@ -5914,10 +6420,10 @@
       </p:grpSpPr>
       <p:sp>
         <p:nvSpPr>
-          <p:cNvPr id="2" name="Title 1">
-            <a:extLst>
-              <a:ext uri="{FF2B5EF4-FFF2-40B4-BE49-F238E27FC236}">
-                <a16:creationId xmlns:a16="http://schemas.microsoft.com/office/drawing/2014/main" id="{007D57B2-713C-7765-DCEC-79F3EA9020A9}"/>
+          <p:cNvPr id="7" name="Title 6">
+            <a:extLst>
+              <a:ext uri="{FF2B5EF4-FFF2-40B4-BE49-F238E27FC236}">
+                <a16:creationId xmlns:a16="http://schemas.microsoft.com/office/drawing/2014/main" id="{D56224DD-6DF5-F5D1-5AFF-9A17767A8ED0}"/>
               </a:ext>
             </a:extLst>
           </p:cNvPr>
@@ -5935,25 +6441,25 @@
           <a:p>
             <a:r>
               <a:rPr lang="en-US" dirty="0"/>
-              <a:t>The PATH variable</a:t>
-            </a:r>
-          </a:p>
-        </p:txBody>
-      </p:sp>
-      <p:sp>
-        <p:nvSpPr>
-          <p:cNvPr id="4" name="Text Placeholder 3">
-            <a:extLst>
-              <a:ext uri="{FF2B5EF4-FFF2-40B4-BE49-F238E27FC236}">
-                <a16:creationId xmlns:a16="http://schemas.microsoft.com/office/drawing/2014/main" id="{41BFF26D-E8E4-A533-8193-27E34AE1A52B}"/>
-              </a:ext>
-            </a:extLst>
-          </p:cNvPr>
-          <p:cNvSpPr>
-            <a:spLocks noGrp="1"/>
-          </p:cNvSpPr>
-          <p:nvPr>
-            <p:ph type="body" idx="1"/>
+              <a:t>What is the PATH?</a:t>
+            </a:r>
+          </a:p>
+        </p:txBody>
+      </p:sp>
+      <p:sp>
+        <p:nvSpPr>
+          <p:cNvPr id="8" name="Content Placeholder 7">
+            <a:extLst>
+              <a:ext uri="{FF2B5EF4-FFF2-40B4-BE49-F238E27FC236}">
+                <a16:creationId xmlns:a16="http://schemas.microsoft.com/office/drawing/2014/main" id="{A17E43E9-111D-C4CA-BF7B-6F371E16F110}"/>
+              </a:ext>
+            </a:extLst>
+          </p:cNvPr>
+          <p:cNvSpPr>
+            <a:spLocks noGrp="1"/>
+          </p:cNvSpPr>
+          <p:nvPr>
+            <p:ph idx="1"/>
           </p:nvPr>
         </p:nvSpPr>
         <p:spPr/>
@@ -5963,201 +6469,27 @@
           <a:p>
             <a:r>
               <a:rPr lang="en-US" dirty="0"/>
-              <a:t>Windows</a:t>
-            </a:r>
-          </a:p>
-        </p:txBody>
-      </p:sp>
-      <p:sp>
-        <p:nvSpPr>
-          <p:cNvPr id="5" name="Content Placeholder 4">
-            <a:extLst>
-              <a:ext uri="{FF2B5EF4-FFF2-40B4-BE49-F238E27FC236}">
-                <a16:creationId xmlns:a16="http://schemas.microsoft.com/office/drawing/2014/main" id="{874050EF-79C9-6E15-702E-4920E9702599}"/>
-              </a:ext>
-            </a:extLst>
-          </p:cNvPr>
-          <p:cNvSpPr>
-            <a:spLocks noGrp="1"/>
-          </p:cNvSpPr>
-          <p:nvPr>
-            <p:ph sz="half" idx="2"/>
-          </p:nvPr>
-        </p:nvSpPr>
-        <p:spPr/>
-        <p:txBody>
-          <a:bodyPr>
-            <a:normAutofit/>
-          </a:bodyPr>
-          <a:lstStyle/>
+              <a:t>A list of directories to find executables within</a:t>
+            </a:r>
+          </a:p>
           <a:p>
             <a:r>
               <a:rPr lang="en-US" dirty="0"/>
-              <a:t>System Properties </a:t>
-            </a:r>
-            <a:r>
-              <a:rPr lang="en-US" dirty="0">
-                <a:sym typeface="Wingdings" panose="05000000000000000000" pitchFamily="2" charset="2"/>
-              </a:rPr>
-              <a:t> Environment Variables  Path</a:t>
-            </a:r>
-          </a:p>
-          <a:p>
-            <a:r>
-              <a:rPr lang="en-US" dirty="0" err="1">
-                <a:sym typeface="Wingdings" panose="05000000000000000000" pitchFamily="2" charset="2"/>
-              </a:rPr>
-              <a:t>Powershell</a:t>
-            </a:r>
-            <a:r>
-              <a:rPr lang="en-US" dirty="0">
-                <a:sym typeface="Wingdings" panose="05000000000000000000" pitchFamily="2" charset="2"/>
-              </a:rPr>
-              <a:t>: </a:t>
-            </a:r>
-            <a:r>
-              <a:rPr lang="en-US" dirty="0">
-                <a:latin typeface="Courier New" panose="02070309020205020404" pitchFamily="49" charset="0"/>
-                <a:cs typeface="Courier New" panose="02070309020205020404" pitchFamily="49" charset="0"/>
-                <a:sym typeface="Wingdings" panose="05000000000000000000" pitchFamily="2" charset="2"/>
-              </a:rPr>
-              <a:t>$</a:t>
-            </a:r>
-            <a:r>
-              <a:rPr lang="en-US" dirty="0" err="1">
-                <a:latin typeface="Courier New" panose="02070309020205020404" pitchFamily="49" charset="0"/>
-                <a:cs typeface="Courier New" panose="02070309020205020404" pitchFamily="49" charset="0"/>
-                <a:sym typeface="Wingdings" panose="05000000000000000000" pitchFamily="2" charset="2"/>
-              </a:rPr>
-              <a:t>env:path</a:t>
-            </a:r>
-            <a:endParaRPr lang="en-US" dirty="0">
-              <a:latin typeface="Courier New" panose="02070309020205020404" pitchFamily="49" charset="0"/>
-              <a:cs typeface="Courier New" panose="02070309020205020404" pitchFamily="49" charset="0"/>
-              <a:sym typeface="Wingdings" panose="05000000000000000000" pitchFamily="2" charset="2"/>
-            </a:endParaRPr>
-          </a:p>
-          <a:p>
-            <a:r>
-              <a:rPr lang="en-US" dirty="0" err="1">
-                <a:sym typeface="Wingdings" panose="05000000000000000000" pitchFamily="2" charset="2"/>
-              </a:rPr>
-              <a:t>Cmd</a:t>
-            </a:r>
-            <a:r>
-              <a:rPr lang="en-US" dirty="0">
-                <a:sym typeface="Wingdings" panose="05000000000000000000" pitchFamily="2" charset="2"/>
-              </a:rPr>
-              <a:t>: </a:t>
-            </a:r>
-            <a:r>
-              <a:rPr lang="en-US" dirty="0">
-                <a:latin typeface="Courier New" panose="02070309020205020404" pitchFamily="49" charset="0"/>
-                <a:cs typeface="Courier New" panose="02070309020205020404" pitchFamily="49" charset="0"/>
-                <a:sym typeface="Wingdings" panose="05000000000000000000" pitchFamily="2" charset="2"/>
-              </a:rPr>
-              <a:t>set path</a:t>
-            </a:r>
-          </a:p>
-          <a:p>
-            <a:pPr marL="0" indent="0">
-              <a:buNone/>
-            </a:pPr>
-            <a:endParaRPr lang="en-US" dirty="0">
-              <a:sym typeface="Wingdings" panose="05000000000000000000" pitchFamily="2" charset="2"/>
-            </a:endParaRPr>
-          </a:p>
-          <a:p>
-            <a:r>
-              <a:rPr lang="en-US" dirty="0">
-                <a:sym typeface="Wingdings" panose="05000000000000000000" pitchFamily="2" charset="2"/>
-              </a:rPr>
-              <a:t>What does it look like?</a:t>
-            </a:r>
-          </a:p>
-          <a:p>
-            <a:r>
-              <a:rPr lang="en-US" dirty="0">
-                <a:sym typeface="Wingdings" panose="05000000000000000000" pitchFamily="2" charset="2"/>
-              </a:rPr>
-              <a:t>System and user level</a:t>
-            </a:r>
-          </a:p>
-          <a:p>
-            <a:endParaRPr lang="en-US" dirty="0"/>
-          </a:p>
-        </p:txBody>
-      </p:sp>
-      <p:sp>
-        <p:nvSpPr>
-          <p:cNvPr id="6" name="Text Placeholder 5">
-            <a:extLst>
-              <a:ext uri="{FF2B5EF4-FFF2-40B4-BE49-F238E27FC236}">
-                <a16:creationId xmlns:a16="http://schemas.microsoft.com/office/drawing/2014/main" id="{A80B3CA4-4F95-AADF-4534-1975F07C2478}"/>
-              </a:ext>
-            </a:extLst>
-          </p:cNvPr>
-          <p:cNvSpPr>
-            <a:spLocks noGrp="1"/>
-          </p:cNvSpPr>
-          <p:nvPr>
-            <p:ph type="body" sz="quarter" idx="3"/>
-          </p:nvPr>
-        </p:nvSpPr>
-        <p:spPr/>
-        <p:txBody>
-          <a:bodyPr/>
-          <a:lstStyle/>
+              <a:t>The OS will search directories in order</a:t>
+            </a:r>
+          </a:p>
           <a:p>
             <a:r>
               <a:rPr lang="en-US" dirty="0"/>
-              <a:t>Linux</a:t>
-            </a:r>
-          </a:p>
-        </p:txBody>
-      </p:sp>
-      <p:sp>
-        <p:nvSpPr>
-          <p:cNvPr id="7" name="Content Placeholder 6">
-            <a:extLst>
-              <a:ext uri="{FF2B5EF4-FFF2-40B4-BE49-F238E27FC236}">
-                <a16:creationId xmlns:a16="http://schemas.microsoft.com/office/drawing/2014/main" id="{0738A67A-37C6-2FFC-5E4B-1FA460D02EF4}"/>
-              </a:ext>
-            </a:extLst>
-          </p:cNvPr>
-          <p:cNvSpPr>
-            <a:spLocks noGrp="1"/>
-          </p:cNvSpPr>
-          <p:nvPr>
-            <p:ph sz="quarter" idx="4"/>
-          </p:nvPr>
-        </p:nvSpPr>
-        <p:spPr/>
-        <p:txBody>
-          <a:bodyPr>
-            <a:normAutofit/>
-          </a:bodyPr>
-          <a:lstStyle/>
-          <a:p>
-            <a:r>
-              <a:rPr lang="en-US" dirty="0">
-                <a:latin typeface="Courier New" panose="02070309020205020404" pitchFamily="49" charset="0"/>
-                <a:cs typeface="Courier New" panose="02070309020205020404" pitchFamily="49" charset="0"/>
-              </a:rPr>
-              <a:t>echo $PATH</a:t>
-            </a:r>
-          </a:p>
-          <a:p>
-            <a:endParaRPr lang="en-US" dirty="0">
-              <a:cs typeface="Courier New" panose="02070309020205020404" pitchFamily="49" charset="0"/>
-            </a:endParaRPr>
+              <a:t>The first match is the executable that is executed</a:t>
+            </a:r>
           </a:p>
         </p:txBody>
       </p:sp>
     </p:spTree>
     <p:extLst>
       <p:ext uri="{BB962C8B-B14F-4D97-AF65-F5344CB8AC3E}">
-        <p14:creationId xmlns:p14="http://schemas.microsoft.com/office/powerpoint/2010/main" val="527736500"/>
+        <p14:creationId xmlns:p14="http://schemas.microsoft.com/office/powerpoint/2010/main" val="3452796235"/>
       </p:ext>
     </p:extLst>
   </p:cSld>
@@ -6186,10 +6518,10 @@
       </p:grpSpPr>
       <p:sp>
         <p:nvSpPr>
-          <p:cNvPr id="7" name="Title 6">
-            <a:extLst>
-              <a:ext uri="{FF2B5EF4-FFF2-40B4-BE49-F238E27FC236}">
-                <a16:creationId xmlns:a16="http://schemas.microsoft.com/office/drawing/2014/main" id="{D56224DD-6DF5-F5D1-5AFF-9A17767A8ED0}"/>
+          <p:cNvPr id="2" name="Title 1">
+            <a:extLst>
+              <a:ext uri="{FF2B5EF4-FFF2-40B4-BE49-F238E27FC236}">
+                <a16:creationId xmlns:a16="http://schemas.microsoft.com/office/drawing/2014/main" id="{007D57B2-713C-7765-DCEC-79F3EA9020A9}"/>
               </a:ext>
             </a:extLst>
           </p:cNvPr>
@@ -6207,25 +6539,25 @@
           <a:p>
             <a:r>
               <a:rPr lang="en-US" dirty="0"/>
-              <a:t>Inspecting the PATH</a:t>
-            </a:r>
-          </a:p>
-        </p:txBody>
-      </p:sp>
-      <p:sp>
-        <p:nvSpPr>
-          <p:cNvPr id="8" name="Content Placeholder 7">
-            <a:extLst>
-              <a:ext uri="{FF2B5EF4-FFF2-40B4-BE49-F238E27FC236}">
-                <a16:creationId xmlns:a16="http://schemas.microsoft.com/office/drawing/2014/main" id="{A17E43E9-111D-C4CA-BF7B-6F371E16F110}"/>
-              </a:ext>
-            </a:extLst>
-          </p:cNvPr>
-          <p:cNvSpPr>
-            <a:spLocks noGrp="1"/>
-          </p:cNvSpPr>
-          <p:nvPr>
-            <p:ph idx="1"/>
+              <a:t>Look to the PATH</a:t>
+            </a:r>
+          </a:p>
+        </p:txBody>
+      </p:sp>
+      <p:sp>
+        <p:nvSpPr>
+          <p:cNvPr id="4" name="Text Placeholder 3">
+            <a:extLst>
+              <a:ext uri="{FF2B5EF4-FFF2-40B4-BE49-F238E27FC236}">
+                <a16:creationId xmlns:a16="http://schemas.microsoft.com/office/drawing/2014/main" id="{41BFF26D-E8E4-A533-8193-27E34AE1A52B}"/>
+              </a:ext>
+            </a:extLst>
+          </p:cNvPr>
+          <p:cNvSpPr>
+            <a:spLocks noGrp="1"/>
+          </p:cNvSpPr>
+          <p:nvPr>
+            <p:ph type="body" idx="1"/>
           </p:nvPr>
         </p:nvSpPr>
         <p:spPr/>
@@ -6235,15 +6567,201 @@
           <a:p>
             <a:r>
               <a:rPr lang="en-US" dirty="0"/>
-              <a:t>Windows &amp; Linux demo</a:t>
-            </a:r>
+              <a:t>Windows</a:t>
+            </a:r>
+          </a:p>
+        </p:txBody>
+      </p:sp>
+      <p:sp>
+        <p:nvSpPr>
+          <p:cNvPr id="5" name="Content Placeholder 4">
+            <a:extLst>
+              <a:ext uri="{FF2B5EF4-FFF2-40B4-BE49-F238E27FC236}">
+                <a16:creationId xmlns:a16="http://schemas.microsoft.com/office/drawing/2014/main" id="{874050EF-79C9-6E15-702E-4920E9702599}"/>
+              </a:ext>
+            </a:extLst>
+          </p:cNvPr>
+          <p:cNvSpPr>
+            <a:spLocks noGrp="1"/>
+          </p:cNvSpPr>
+          <p:nvPr>
+            <p:ph sz="half" idx="2"/>
+          </p:nvPr>
+        </p:nvSpPr>
+        <p:spPr/>
+        <p:txBody>
+          <a:bodyPr>
+            <a:normAutofit/>
+          </a:bodyPr>
+          <a:lstStyle/>
+          <a:p>
+            <a:r>
+              <a:rPr lang="en-US" dirty="0"/>
+              <a:t>System Properties </a:t>
+            </a:r>
+            <a:r>
+              <a:rPr lang="en-US" dirty="0">
+                <a:sym typeface="Wingdings" panose="05000000000000000000" pitchFamily="2" charset="2"/>
+              </a:rPr>
+              <a:t> Environment Variables  Path</a:t>
+            </a:r>
+          </a:p>
+          <a:p>
+            <a:r>
+              <a:rPr lang="en-US" dirty="0" err="1">
+                <a:sym typeface="Wingdings" panose="05000000000000000000" pitchFamily="2" charset="2"/>
+              </a:rPr>
+              <a:t>Powershell</a:t>
+            </a:r>
+            <a:r>
+              <a:rPr lang="en-US" dirty="0">
+                <a:sym typeface="Wingdings" panose="05000000000000000000" pitchFamily="2" charset="2"/>
+              </a:rPr>
+              <a:t>: </a:t>
+            </a:r>
+            <a:r>
+              <a:rPr lang="en-US" dirty="0">
+                <a:latin typeface="Courier New" panose="02070309020205020404" pitchFamily="49" charset="0"/>
+                <a:cs typeface="Courier New" panose="02070309020205020404" pitchFamily="49" charset="0"/>
+                <a:sym typeface="Wingdings" panose="05000000000000000000" pitchFamily="2" charset="2"/>
+              </a:rPr>
+              <a:t>$</a:t>
+            </a:r>
+            <a:r>
+              <a:rPr lang="en-US" dirty="0" err="1">
+                <a:latin typeface="Courier New" panose="02070309020205020404" pitchFamily="49" charset="0"/>
+                <a:cs typeface="Courier New" panose="02070309020205020404" pitchFamily="49" charset="0"/>
+                <a:sym typeface="Wingdings" panose="05000000000000000000" pitchFamily="2" charset="2"/>
+              </a:rPr>
+              <a:t>env:path</a:t>
+            </a:r>
+            <a:endParaRPr lang="en-US" dirty="0">
+              <a:latin typeface="Courier New" panose="02070309020205020404" pitchFamily="49" charset="0"/>
+              <a:cs typeface="Courier New" panose="02070309020205020404" pitchFamily="49" charset="0"/>
+              <a:sym typeface="Wingdings" panose="05000000000000000000" pitchFamily="2" charset="2"/>
+            </a:endParaRPr>
+          </a:p>
+          <a:p>
+            <a:r>
+              <a:rPr lang="en-US" dirty="0" err="1">
+                <a:sym typeface="Wingdings" panose="05000000000000000000" pitchFamily="2" charset="2"/>
+              </a:rPr>
+              <a:t>Cmd</a:t>
+            </a:r>
+            <a:r>
+              <a:rPr lang="en-US" dirty="0">
+                <a:sym typeface="Wingdings" panose="05000000000000000000" pitchFamily="2" charset="2"/>
+              </a:rPr>
+              <a:t>: </a:t>
+            </a:r>
+            <a:r>
+              <a:rPr lang="en-US" dirty="0">
+                <a:latin typeface="Courier New" panose="02070309020205020404" pitchFamily="49" charset="0"/>
+                <a:cs typeface="Courier New" panose="02070309020205020404" pitchFamily="49" charset="0"/>
+                <a:sym typeface="Wingdings" panose="05000000000000000000" pitchFamily="2" charset="2"/>
+              </a:rPr>
+              <a:t>set path</a:t>
+            </a:r>
+          </a:p>
+          <a:p>
+            <a:pPr marL="0" indent="0">
+              <a:buNone/>
+            </a:pPr>
+            <a:endParaRPr lang="en-US" dirty="0">
+              <a:sym typeface="Wingdings" panose="05000000000000000000" pitchFamily="2" charset="2"/>
+            </a:endParaRPr>
+          </a:p>
+          <a:p>
+            <a:r>
+              <a:rPr lang="en-US" dirty="0">
+                <a:sym typeface="Wingdings" panose="05000000000000000000" pitchFamily="2" charset="2"/>
+              </a:rPr>
+              <a:t>What does it look like?</a:t>
+            </a:r>
+          </a:p>
+          <a:p>
+            <a:r>
+              <a:rPr lang="en-US" dirty="0">
+                <a:sym typeface="Wingdings" panose="05000000000000000000" pitchFamily="2" charset="2"/>
+              </a:rPr>
+              <a:t>System and user level</a:t>
+            </a:r>
+          </a:p>
+          <a:p>
+            <a:endParaRPr lang="en-US" dirty="0"/>
+          </a:p>
+        </p:txBody>
+      </p:sp>
+      <p:sp>
+        <p:nvSpPr>
+          <p:cNvPr id="6" name="Text Placeholder 5">
+            <a:extLst>
+              <a:ext uri="{FF2B5EF4-FFF2-40B4-BE49-F238E27FC236}">
+                <a16:creationId xmlns:a16="http://schemas.microsoft.com/office/drawing/2014/main" id="{A80B3CA4-4F95-AADF-4534-1975F07C2478}"/>
+              </a:ext>
+            </a:extLst>
+          </p:cNvPr>
+          <p:cNvSpPr>
+            <a:spLocks noGrp="1"/>
+          </p:cNvSpPr>
+          <p:nvPr>
+            <p:ph type="body" sz="quarter" idx="3"/>
+          </p:nvPr>
+        </p:nvSpPr>
+        <p:spPr/>
+        <p:txBody>
+          <a:bodyPr/>
+          <a:lstStyle/>
+          <a:p>
+            <a:r>
+              <a:rPr lang="en-US" dirty="0"/>
+              <a:t>Linux</a:t>
+            </a:r>
+          </a:p>
+        </p:txBody>
+      </p:sp>
+      <p:sp>
+        <p:nvSpPr>
+          <p:cNvPr id="7" name="Content Placeholder 6">
+            <a:extLst>
+              <a:ext uri="{FF2B5EF4-FFF2-40B4-BE49-F238E27FC236}">
+                <a16:creationId xmlns:a16="http://schemas.microsoft.com/office/drawing/2014/main" id="{0738A67A-37C6-2FFC-5E4B-1FA460D02EF4}"/>
+              </a:ext>
+            </a:extLst>
+          </p:cNvPr>
+          <p:cNvSpPr>
+            <a:spLocks noGrp="1"/>
+          </p:cNvSpPr>
+          <p:nvPr>
+            <p:ph sz="quarter" idx="4"/>
+          </p:nvPr>
+        </p:nvSpPr>
+        <p:spPr/>
+        <p:txBody>
+          <a:bodyPr>
+            <a:normAutofit/>
+          </a:bodyPr>
+          <a:lstStyle/>
+          <a:p>
+            <a:r>
+              <a:rPr lang="en-US" dirty="0">
+                <a:latin typeface="Courier New" panose="02070309020205020404" pitchFamily="49" charset="0"/>
+                <a:cs typeface="Courier New" panose="02070309020205020404" pitchFamily="49" charset="0"/>
+              </a:rPr>
+              <a:t>echo $PATH</a:t>
+            </a:r>
+          </a:p>
+          <a:p>
+            <a:endParaRPr lang="en-US" dirty="0">
+              <a:cs typeface="Courier New" panose="02070309020205020404" pitchFamily="49" charset="0"/>
+            </a:endParaRPr>
           </a:p>
         </p:txBody>
       </p:sp>
     </p:spTree>
     <p:extLst>
       <p:ext uri="{BB962C8B-B14F-4D97-AF65-F5344CB8AC3E}">
-        <p14:creationId xmlns:p14="http://schemas.microsoft.com/office/powerpoint/2010/main" val="3452796235"/>
+        <p14:creationId xmlns:p14="http://schemas.microsoft.com/office/powerpoint/2010/main" val="527736500"/>
       </p:ext>
     </p:extLst>
   </p:cSld>

</xml_diff>